<commit_message>
cc-eval: wordsmithing and PDF generated.
</commit_message>
<xml_diff>
--- a/ppt-ietf87-rmcat-cc-eval-00.pptx
+++ b/ppt-ietf87-rmcat-cc-eval-00.pptx
@@ -12,6 +12,7 @@
     <p:sldId id="260" r:id="rId6"/>
     <p:sldId id="261" r:id="rId7"/>
     <p:sldId id="262" r:id="rId8"/>
+    <p:sldId id="263" r:id="rId9"/>
   </p:sldIdLst>
   <p:sldSz cx="9144000" cy="6858000" type="screen4x3"/>
   <p:notesSz cx="6858000" cy="9144000"/>
@@ -294,7 +295,7 @@
           <a:p>
             <a:fld id="{51E6C096-D30E-9A4B-94F7-75F44D13C3C0}" type="datetimeFigureOut">
               <a:rPr lang="en-US" smtClean="0"/>
-              <a:t>7/28/13</a:t>
+              <a:t>7/29/13</a:t>
             </a:fld>
             <a:endParaRPr lang="en-US"/>
           </a:p>
@@ -464,7 +465,7 @@
           <a:p>
             <a:fld id="{51E6C096-D30E-9A4B-94F7-75F44D13C3C0}" type="datetimeFigureOut">
               <a:rPr lang="en-US" smtClean="0"/>
-              <a:t>7/28/13</a:t>
+              <a:t>7/29/13</a:t>
             </a:fld>
             <a:endParaRPr lang="en-US"/>
           </a:p>
@@ -644,7 +645,7 @@
           <a:p>
             <a:fld id="{51E6C096-D30E-9A4B-94F7-75F44D13C3C0}" type="datetimeFigureOut">
               <a:rPr lang="en-US" smtClean="0"/>
-              <a:t>7/28/13</a:t>
+              <a:t>7/29/13</a:t>
             </a:fld>
             <a:endParaRPr lang="en-US"/>
           </a:p>
@@ -814,7 +815,7 @@
           <a:p>
             <a:fld id="{51E6C096-D30E-9A4B-94F7-75F44D13C3C0}" type="datetimeFigureOut">
               <a:rPr lang="en-US" smtClean="0"/>
-              <a:t>7/28/13</a:t>
+              <a:t>7/29/13</a:t>
             </a:fld>
             <a:endParaRPr lang="en-US"/>
           </a:p>
@@ -1060,7 +1061,7 @@
           <a:p>
             <a:fld id="{51E6C096-D30E-9A4B-94F7-75F44D13C3C0}" type="datetimeFigureOut">
               <a:rPr lang="en-US" smtClean="0"/>
-              <a:t>7/28/13</a:t>
+              <a:t>7/29/13</a:t>
             </a:fld>
             <a:endParaRPr lang="en-US"/>
           </a:p>
@@ -1348,7 +1349,7 @@
           <a:p>
             <a:fld id="{51E6C096-D30E-9A4B-94F7-75F44D13C3C0}" type="datetimeFigureOut">
               <a:rPr lang="en-US" smtClean="0"/>
-              <a:t>7/28/13</a:t>
+              <a:t>7/29/13</a:t>
             </a:fld>
             <a:endParaRPr lang="en-US"/>
           </a:p>
@@ -1770,7 +1771,7 @@
           <a:p>
             <a:fld id="{51E6C096-D30E-9A4B-94F7-75F44D13C3C0}" type="datetimeFigureOut">
               <a:rPr lang="en-US" smtClean="0"/>
-              <a:t>7/28/13</a:t>
+              <a:t>7/29/13</a:t>
             </a:fld>
             <a:endParaRPr lang="en-US"/>
           </a:p>
@@ -1888,7 +1889,7 @@
           <a:p>
             <a:fld id="{51E6C096-D30E-9A4B-94F7-75F44D13C3C0}" type="datetimeFigureOut">
               <a:rPr lang="en-US" smtClean="0"/>
-              <a:t>7/28/13</a:t>
+              <a:t>7/29/13</a:t>
             </a:fld>
             <a:endParaRPr lang="en-US"/>
           </a:p>
@@ -1983,7 +1984,7 @@
           <a:p>
             <a:fld id="{51E6C096-D30E-9A4B-94F7-75F44D13C3C0}" type="datetimeFigureOut">
               <a:rPr lang="en-US" smtClean="0"/>
-              <a:t>7/28/13</a:t>
+              <a:t>7/29/13</a:t>
             </a:fld>
             <a:endParaRPr lang="en-US"/>
           </a:p>
@@ -2260,7 +2261,7 @@
           <a:p>
             <a:fld id="{51E6C096-D30E-9A4B-94F7-75F44D13C3C0}" type="datetimeFigureOut">
               <a:rPr lang="en-US" smtClean="0"/>
-              <a:t>7/28/13</a:t>
+              <a:t>7/29/13</a:t>
             </a:fld>
             <a:endParaRPr lang="en-US"/>
           </a:p>
@@ -2517,7 +2518,7 @@
           <a:p>
             <a:fld id="{51E6C096-D30E-9A4B-94F7-75F44D13C3C0}" type="datetimeFigureOut">
               <a:rPr lang="en-US" smtClean="0"/>
-              <a:t>7/28/13</a:t>
+              <a:t>7/29/13</a:t>
             </a:fld>
             <a:endParaRPr lang="en-US"/>
           </a:p>
@@ -2735,7 +2736,7 @@
           <a:p>
             <a:fld id="{51E6C096-D30E-9A4B-94F7-75F44D13C3C0}" type="datetimeFigureOut">
               <a:rPr lang="en-US" smtClean="0"/>
-              <a:t>7/28/13</a:t>
+              <a:t>7/29/13</a:t>
             </a:fld>
             <a:endParaRPr lang="en-US"/>
           </a:p>
@@ -3163,7 +3164,11 @@
           <a:p>
             <a:r>
               <a:rPr lang="en-US" dirty="0" smtClean="0"/>
-              <a:t>IETF 87, RMCAT</a:t>
+              <a:t>01 August 2013, IETF </a:t>
+            </a:r>
+            <a:r>
+              <a:rPr lang="en-US" dirty="0" smtClean="0"/>
+              <a:t>87, RMCAT</a:t>
             </a:r>
           </a:p>
           <a:p>
@@ -3171,12 +3176,23 @@
           </a:p>
           <a:p>
             <a:r>
-              <a:rPr lang="en-US" dirty="0" smtClean="0"/>
-              <a:t>Varun Singh, </a:t>
+              <a:rPr lang="en-US" dirty="0" smtClean="0">
+                <a:solidFill>
+                  <a:schemeClr val="tx1">
+                    <a:lumMod val="75000"/>
+                    <a:lumOff val="25000"/>
+                  </a:schemeClr>
+                </a:solidFill>
+              </a:rPr>
+              <a:t>Varun Singh</a:t>
+            </a:r>
+            <a:r>
+              <a:rPr lang="en-US" dirty="0" smtClean="0"/>
+              <a:t>, </a:t>
             </a:r>
             <a:r>
               <a:rPr lang="en-US" dirty="0" err="1" smtClean="0"/>
-              <a:t>Joerg</a:t>
+              <a:t>Jörg</a:t>
             </a:r>
             <a:r>
               <a:rPr lang="en-US" dirty="0" smtClean="0"/>
@@ -3200,6 +3216,13 @@
   <p:clrMapOvr>
     <a:masterClrMapping/>
   </p:clrMapOvr>
+  <p:timing>
+    <p:tnLst>
+      <p:par>
+        <p:cTn xmlns:p14="http://schemas.microsoft.com/office/powerpoint/2010/main" id="1" dur="indefinite" restart="never" nodeType="tmRoot"/>
+      </p:par>
+    </p:tnLst>
+  </p:timing>
 </p:sld>
 </file>
 
@@ -3291,20 +3314,20 @@
             </a:r>
           </a:p>
           <a:p>
+            <a:pPr lvl="1"/>
+            <a:r>
+              <a:rPr lang="en-US" dirty="0" smtClean="0"/>
+              <a:t>Use RTPDUMP or already IETF-defined RTP log format?</a:t>
+            </a:r>
+          </a:p>
+          <a:p>
             <a:pPr lvl="4"/>
             <a:endParaRPr lang="en-US" dirty="0" smtClean="0"/>
           </a:p>
           <a:p>
             <a:r>
               <a:rPr lang="en-US" dirty="0" smtClean="0"/>
-              <a:t>Added a new guidelines</a:t>
-            </a:r>
-          </a:p>
-          <a:p>
-            <a:pPr lvl="1"/>
-            <a:r>
-              <a:rPr lang="en-US" dirty="0" smtClean="0"/>
-              <a:t>Startup </a:t>
+              <a:t>Added a new guidelines: Startup </a:t>
             </a:r>
             <a:r>
               <a:rPr lang="en-US" dirty="0" err="1" smtClean="0"/>
@@ -3340,19 +3363,40 @@
             </a:r>
             <a:r>
               <a:rPr lang="en-US" dirty="0" err="1" smtClean="0"/>
-              <a:t>Romalho’s</a:t>
-            </a:r>
-            <a:r>
-              <a:rPr lang="en-US" dirty="0" smtClean="0"/>
-              <a:t> scenario proposal as an appendix</a:t>
+              <a:t>Ramalho’s</a:t>
+            </a:r>
+            <a:r>
+              <a:rPr lang="en-US" dirty="0" smtClean="0"/>
+              <a:t> self-fairness scenario as </a:t>
+            </a:r>
+            <a:r>
+              <a:rPr lang="en-US" dirty="0" smtClean="0"/>
+              <a:t>an appendix</a:t>
             </a:r>
           </a:p>
           <a:p>
             <a:pPr lvl="1"/>
             <a:r>
               <a:rPr lang="en-US" dirty="0" smtClean="0"/>
-              <a:t>Discussed in design team meetings</a:t>
-            </a:r>
+              <a:t>Scenario discussed </a:t>
+            </a:r>
+            <a:r>
+              <a:rPr lang="en-US" dirty="0" smtClean="0"/>
+              <a:t>in </a:t>
+            </a:r>
+            <a:r>
+              <a:rPr lang="en-US" dirty="0" smtClean="0"/>
+              <a:t>the design </a:t>
+            </a:r>
+            <a:r>
+              <a:rPr lang="en-US" dirty="0" smtClean="0"/>
+              <a:t>team </a:t>
+            </a:r>
+            <a:r>
+              <a:rPr lang="en-US" dirty="0" smtClean="0"/>
+              <a:t>meetings </a:t>
+            </a:r>
+            <a:endParaRPr lang="en-US" dirty="0" smtClean="0"/>
           </a:p>
           <a:p>
             <a:pPr lvl="1"/>
@@ -3373,6 +3417,13 @@
   <p:clrMapOvr>
     <a:masterClrMapping/>
   </p:clrMapOvr>
+  <p:timing>
+    <p:tnLst>
+      <p:par>
+        <p:cTn xmlns:p14="http://schemas.microsoft.com/office/powerpoint/2010/main" id="1" dur="indefinite" restart="never" nodeType="tmRoot"/>
+      </p:par>
+    </p:tnLst>
+  </p:timing>
 </p:sld>
 </file>
 
@@ -3433,17 +3484,16 @@
           </a:bodyPr>
           <a:lstStyle/>
           <a:p>
+            <a:pPr marL="0" indent="0">
+              <a:buNone/>
+            </a:pPr>
+            <a:r>
+              <a:rPr lang="en-US" dirty="0" smtClean="0"/>
+              <a:t>The </a:t>
+            </a:r>
             <a:r>
               <a:rPr lang="en-US" dirty="0"/>
-              <a:t>Instead of defining fairness, there has been	</a:t>
-            </a:r>
-            <a:r>
-              <a:rPr lang="en-US" dirty="0" smtClean="0"/>
-              <a:t> discussion </a:t>
-            </a:r>
-            <a:r>
-              <a:rPr lang="en-US" dirty="0"/>
-              <a:t>on defining "unfairness".  The criteria are:	</a:t>
+              <a:t>criteria are:	</a:t>
             </a:r>
             <a:endParaRPr lang="en-US" dirty="0" smtClean="0"/>
           </a:p>
@@ -3543,19 +3593,19 @@
           </a:p>
           <a:p>
             <a:r>
-              <a:rPr lang="en-US" dirty="0" smtClean="0"/>
+              <a:rPr lang="en-US" sz="3400" dirty="0" smtClean="0"/>
               <a:t>Does </a:t>
             </a:r>
             <a:r>
-              <a:rPr lang="en-US" dirty="0"/>
+              <a:rPr lang="en-US" sz="3400" dirty="0"/>
               <a:t>the </a:t>
             </a:r>
             <a:r>
-              <a:rPr lang="en-US" dirty="0" smtClean="0"/>
+              <a:rPr lang="en-US" sz="3400" dirty="0" smtClean="0"/>
               <a:t>criteria capture </a:t>
             </a:r>
             <a:r>
-              <a:rPr lang="en-US" dirty="0"/>
+              <a:rPr lang="en-US" sz="3400" dirty="0"/>
               <a:t>Unfairness adequately?</a:t>
             </a:r>
           </a:p>
@@ -3571,6 +3621,13 @@
   <p:clrMapOvr>
     <a:masterClrMapping/>
   </p:clrMapOvr>
+  <p:timing>
+    <p:tnLst>
+      <p:par>
+        <p:cTn xmlns:p14="http://schemas.microsoft.com/office/powerpoint/2010/main" id="1" dur="indefinite" restart="never" nodeType="tmRoot"/>
+      </p:par>
+    </p:tnLst>
+  </p:timing>
 </p:sld>
 </file>
 
@@ -3627,14 +3684,15 @@
         <p:spPr/>
         <p:txBody>
           <a:bodyPr>
-            <a:normAutofit fontScale="92500" lnSpcReduction="20000"/>
+            <a:normAutofit fontScale="85000" lnSpcReduction="20000"/>
           </a:bodyPr>
           <a:lstStyle/>
           <a:p>
             <a:r>
               <a:rPr lang="en-US" dirty="0" smtClean="0"/>
-              <a:t>Define Unfairness</a:t>
-            </a:r>
+              <a:t>Agree on Unfairness definition</a:t>
+            </a:r>
+            <a:endParaRPr lang="en-US" dirty="0" smtClean="0"/>
           </a:p>
           <a:p>
             <a:pPr lvl="7"/>
@@ -3699,6 +3757,29 @@
               <a:rPr lang="en-US" dirty="0" smtClean="0"/>
               <a:t>Or delegate this to the description of each scenario?</a:t>
             </a:r>
+          </a:p>
+          <a:p>
+            <a:pPr lvl="7"/>
+            <a:endParaRPr lang="en-US" dirty="0" smtClean="0"/>
+          </a:p>
+          <a:p>
+            <a:r>
+              <a:rPr lang="en-US" dirty="0" smtClean="0"/>
+              <a:t>Is </a:t>
+            </a:r>
+            <a:r>
+              <a:rPr lang="en-US" dirty="0"/>
+              <a:t>the quality </a:t>
+            </a:r>
+            <a:r>
+              <a:rPr lang="en-US" dirty="0" smtClean="0"/>
+              <a:t>metric entirely </a:t>
+            </a:r>
+            <a:r>
+              <a:rPr lang="en-US" dirty="0"/>
+              <a:t>off the table?</a:t>
+            </a:r>
+            <a:endParaRPr lang="en-US" dirty="0" smtClean="0"/>
           </a:p>
           <a:p>
             <a:pPr lvl="7"/>
@@ -3722,6 +3803,13 @@
   <p:clrMapOvr>
     <a:masterClrMapping/>
   </p:clrMapOvr>
+  <p:timing>
+    <p:tnLst>
+      <p:par>
+        <p:cTn xmlns:p14="http://schemas.microsoft.com/office/powerpoint/2010/main" id="1" dur="indefinite" restart="never" nodeType="tmRoot"/>
+      </p:par>
+    </p:tnLst>
+  </p:timing>
 </p:sld>
 </file>
 
@@ -3782,17 +3870,20 @@
           </a:bodyPr>
           <a:lstStyle/>
           <a:p>
-            <a:r>
-              <a:rPr lang="en-US" dirty="0" smtClean="0"/>
-              <a:t>A suite of options to </a:t>
-            </a:r>
-            <a:r>
-              <a:rPr lang="en-US" b="1" u="sng" dirty="0" smtClean="0"/>
+            <a:pPr marL="0" indent="0">
+              <a:buNone/>
+            </a:pPr>
+            <a:r>
+              <a:rPr lang="en-US" sz="4000" dirty="0" smtClean="0"/>
+              <a:t>A suite of parameters to </a:t>
+            </a:r>
+            <a:r>
+              <a:rPr lang="en-US" sz="4000" b="1" u="sng" dirty="0" smtClean="0"/>
               <a:t>create</a:t>
             </a:r>
             <a:r>
-              <a:rPr lang="en-US" dirty="0" smtClean="0"/>
-              <a:t> new scenarios</a:t>
+              <a:rPr lang="en-US" sz="4000" dirty="0" smtClean="0"/>
+              <a:t> new scenarios:</a:t>
             </a:r>
           </a:p>
           <a:p>
@@ -3830,14 +3921,14 @@
           <a:p>
             <a:r>
               <a:rPr lang="en-US" dirty="0" smtClean="0"/>
-              <a:t>Link parameters</a:t>
+              <a:t>List of Link parameters</a:t>
             </a:r>
           </a:p>
           <a:p>
             <a:pPr lvl="1"/>
             <a:r>
               <a:rPr lang="en-US" dirty="0" smtClean="0"/>
-              <a:t>List of link losses and link latency</a:t>
+              <a:t>Link losses and link latency</a:t>
             </a:r>
           </a:p>
           <a:p>
@@ -3853,12 +3944,16 @@
           <a:p>
             <a:pPr lvl="1"/>
             <a:r>
+              <a:rPr lang="en-US" dirty="0" smtClean="0"/>
+              <a:t>Only </a:t>
+            </a:r>
+            <a:r>
               <a:rPr lang="en-US" dirty="0" err="1" smtClean="0"/>
               <a:t>Droptail</a:t>
             </a:r>
             <a:r>
               <a:rPr lang="en-US" dirty="0" smtClean="0"/>
-              <a:t> queue</a:t>
+              <a:t> queues</a:t>
             </a:r>
           </a:p>
           <a:p>
@@ -3898,6 +3993,13 @@
   <p:clrMapOvr>
     <a:masterClrMapping/>
   </p:clrMapOvr>
+  <p:timing>
+    <p:tnLst>
+      <p:par>
+        <p:cTn xmlns:p14="http://schemas.microsoft.com/office/powerpoint/2010/main" id="1" dur="indefinite" restart="never" nodeType="tmRoot"/>
+      </p:par>
+    </p:tnLst>
+  </p:timing>
 </p:sld>
 </file>
 
@@ -4104,6 +4206,13 @@
   <p:clrMapOvr>
     <a:masterClrMapping/>
   </p:clrMapOvr>
+  <p:timing>
+    <p:tnLst>
+      <p:par>
+        <p:cTn xmlns:p14="http://schemas.microsoft.com/office/powerpoint/2010/main" id="1" dur="indefinite" restart="never" nodeType="tmRoot"/>
+      </p:par>
+    </p:tnLst>
+  </p:timing>
 </p:sld>
 </file>
 
@@ -4178,13 +4287,20 @@
         <p:spPr/>
         <p:txBody>
           <a:bodyPr>
-            <a:normAutofit fontScale="92500" lnSpcReduction="20000"/>
+            <a:normAutofit fontScale="85000" lnSpcReduction="10000"/>
           </a:bodyPr>
           <a:lstStyle/>
           <a:p>
             <a:r>
               <a:rPr lang="en-US" dirty="0" smtClean="0"/>
               <a:t>Map wireless access links to link properties?</a:t>
+            </a:r>
+          </a:p>
+          <a:p>
+            <a:pPr lvl="1"/>
+            <a:r>
+              <a:rPr lang="en-US" dirty="0" smtClean="0"/>
+              <a:t>Different for 3G/LTE and WLAN?</a:t>
             </a:r>
           </a:p>
           <a:p>
@@ -4194,7 +4310,7 @@
           <a:p>
             <a:r>
               <a:rPr lang="en-US" dirty="0" smtClean="0"/>
-              <a:t>Losses</a:t>
+              <a:t>Link losses</a:t>
             </a:r>
           </a:p>
           <a:p>
@@ -4220,7 +4336,7 @@
             </a:r>
           </a:p>
           <a:p>
-            <a:pPr lvl="4"/>
+            <a:pPr lvl="5"/>
             <a:endParaRPr lang="en-US" dirty="0" smtClean="0"/>
           </a:p>
           <a:p>
@@ -4242,15 +4358,6 @@
               <a:rPr lang="en-US" dirty="0" smtClean="0"/>
               <a:t>End-to-end</a:t>
             </a:r>
-          </a:p>
-          <a:p>
-            <a:pPr marL="0" indent="0">
-              <a:buNone/>
-            </a:pPr>
-            <a:endParaRPr lang="en-US" dirty="0" smtClean="0"/>
-          </a:p>
-          <a:p>
-            <a:endParaRPr lang="en-US" dirty="0"/>
           </a:p>
         </p:txBody>
       </p:sp>
@@ -4264,6 +4371,110 @@
   <p:clrMapOvr>
     <a:masterClrMapping/>
   </p:clrMapOvr>
+  <p:timing>
+    <p:tnLst>
+      <p:par>
+        <p:cTn xmlns:p14="http://schemas.microsoft.com/office/powerpoint/2010/main" id="1" dur="indefinite" restart="never" nodeType="tmRoot"/>
+      </p:par>
+    </p:tnLst>
+  </p:timing>
+</p:sld>
+</file>
+
+<file path=ppt/slides/slide8.xml><?xml version="1.0" encoding="utf-8"?>
+<p:sld xmlns:a="http://schemas.openxmlformats.org/drawingml/2006/main" xmlns:r="http://schemas.openxmlformats.org/officeDocument/2006/relationships" xmlns:p="http://schemas.openxmlformats.org/presentationml/2006/main">
+  <p:cSld>
+    <p:spTree>
+      <p:nvGrpSpPr>
+        <p:cNvPr id="1" name=""/>
+        <p:cNvGrpSpPr/>
+        <p:nvPr/>
+      </p:nvGrpSpPr>
+      <p:grpSpPr>
+        <a:xfrm>
+          <a:off x="0" y="0"/>
+          <a:ext cx="0" cy="0"/>
+          <a:chOff x="0" y="0"/>
+          <a:chExt cx="0" cy="0"/>
+        </a:xfrm>
+      </p:grpSpPr>
+      <p:sp>
+        <p:nvSpPr>
+          <p:cNvPr id="2" name="Title 1"/>
+          <p:cNvSpPr>
+            <a:spLocks noGrp="1"/>
+          </p:cNvSpPr>
+          <p:nvPr>
+            <p:ph type="title"/>
+          </p:nvPr>
+        </p:nvSpPr>
+        <p:spPr/>
+        <p:txBody>
+          <a:bodyPr/>
+          <a:lstStyle/>
+          <a:p>
+            <a:r>
+              <a:rPr lang="en-US" dirty="0" smtClean="0"/>
+              <a:t>Next Steps</a:t>
+            </a:r>
+            <a:endParaRPr lang="en-US" dirty="0"/>
+          </a:p>
+        </p:txBody>
+      </p:sp>
+      <p:sp>
+        <p:nvSpPr>
+          <p:cNvPr id="3" name="Content Placeholder 2"/>
+          <p:cNvSpPr>
+            <a:spLocks noGrp="1"/>
+          </p:cNvSpPr>
+          <p:nvPr>
+            <p:ph idx="1"/>
+          </p:nvPr>
+        </p:nvSpPr>
+        <p:spPr/>
+        <p:txBody>
+          <a:bodyPr/>
+          <a:lstStyle/>
+          <a:p>
+            <a:r>
+              <a:rPr lang="en-US" dirty="0" smtClean="0"/>
+              <a:t>How to handle new scenarios?</a:t>
+            </a:r>
+          </a:p>
+          <a:p>
+            <a:endParaRPr lang="en-US" dirty="0"/>
+          </a:p>
+          <a:p>
+            <a:r>
+              <a:rPr lang="en-US" dirty="0" smtClean="0"/>
+              <a:t>Adopt as WG item</a:t>
+            </a:r>
+          </a:p>
+          <a:p>
+            <a:endParaRPr lang="en-US" dirty="0" smtClean="0"/>
+          </a:p>
+          <a:p>
+            <a:endParaRPr lang="en-US" dirty="0"/>
+          </a:p>
+        </p:txBody>
+      </p:sp>
+    </p:spTree>
+    <p:extLst>
+      <p:ext uri="{BB962C8B-B14F-4D97-AF65-F5344CB8AC3E}">
+        <p14:creationId xmlns:p14="http://schemas.microsoft.com/office/powerpoint/2010/main" val="1051058475"/>
+      </p:ext>
+    </p:extLst>
+  </p:cSld>
+  <p:clrMapOvr>
+    <a:masterClrMapping/>
+  </p:clrMapOvr>
+  <p:timing>
+    <p:tnLst>
+      <p:par>
+        <p:cTn xmlns:p14="http://schemas.microsoft.com/office/powerpoint/2010/main" id="1" dur="indefinite" restart="never" nodeType="tmRoot"/>
+      </p:par>
+    </p:tnLst>
+  </p:timing>
 </p:sld>
 </file>
 

</xml_diff>